<commit_message>
uwagi po prezentacji 1
</commit_message>
<xml_diff>
--- a/etap1/Projekt aplikacji symulacji układu automatycznej regulacji.pptx
+++ b/etap1/Projekt aplikacji symulacji układu automatycznej regulacji.pptx
@@ -143,7 +143,7 @@
 <file path=ppt/revisionInfo.xml><?xml version="1.0" encoding="utf-8"?>
 <p1510:revInfo xmlns:a="http://schemas.openxmlformats.org/drawingml/2006/main" xmlns:r="http://schemas.openxmlformats.org/officeDocument/2006/relationships" xmlns:p1510="http://schemas.microsoft.com/office/powerpoint/2015/10/main">
   <p1510:revLst>
-    <p1510:client id="{19648D1D-F2C5-44B8-860B-569345F6F3ED}" v="29" dt="2025-10-20T17:29:07.101"/>
+    <p1510:client id="{19648D1D-F2C5-44B8-860B-569345F6F3ED}" v="31" dt="2025-10-21T11:18:46.636"/>
   </p1510:revLst>
 </p1510:revInfo>
 </file>
@@ -153,7 +153,7 @@
   <pc:docChgLst>
     <pc:chgData name="Kamil Warczek (kw316241)" userId="f3db8089-45d3-4ce7-81b6-9eb81915560c" providerId="ADAL" clId="{C3BDEFB5-E591-4296-8B5E-D036F4630AA8}"/>
     <pc:docChg chg="undo custSel addSld delSld modSld">
-      <pc:chgData name="Kamil Warczek (kw316241)" userId="f3db8089-45d3-4ce7-81b6-9eb81915560c" providerId="ADAL" clId="{C3BDEFB5-E591-4296-8B5E-D036F4630AA8}" dt="2025-10-20T17:29:13.630" v="506" actId="962"/>
+      <pc:chgData name="Kamil Warczek (kw316241)" userId="f3db8089-45d3-4ce7-81b6-9eb81915560c" providerId="ADAL" clId="{C3BDEFB5-E591-4296-8B5E-D036F4630AA8}" dt="2025-10-21T11:18:58.154" v="515" actId="478"/>
       <pc:docMkLst>
         <pc:docMk/>
       </pc:docMkLst>
@@ -165,7 +165,7 @@
         </pc:sldMkLst>
       </pc:sldChg>
       <pc:sldChg chg="addSp delSp modSp mod">
-        <pc:chgData name="Kamil Warczek (kw316241)" userId="f3db8089-45d3-4ce7-81b6-9eb81915560c" providerId="ADAL" clId="{C3BDEFB5-E591-4296-8B5E-D036F4630AA8}" dt="2025-10-20T17:27:46.690" v="501" actId="20577"/>
+        <pc:chgData name="Kamil Warczek (kw316241)" userId="f3db8089-45d3-4ce7-81b6-9eb81915560c" providerId="ADAL" clId="{C3BDEFB5-E591-4296-8B5E-D036F4630AA8}" dt="2025-10-21T11:18:58.154" v="515" actId="478"/>
         <pc:sldMkLst>
           <pc:docMk/>
           <pc:sldMk cId="1593920805" sldId="262"/>
@@ -200,6 +200,14 @@
             <pc:docMk/>
             <pc:sldMk cId="1593920805" sldId="262"/>
             <ac:spMk id="6" creationId="{C952702E-5B27-D279-428F-2D07E2AB4EF4}"/>
+          </ac:spMkLst>
+        </pc:spChg>
+        <pc:spChg chg="add del mod">
+          <ac:chgData name="Kamil Warczek (kw316241)" userId="f3db8089-45d3-4ce7-81b6-9eb81915560c" providerId="ADAL" clId="{C3BDEFB5-E591-4296-8B5E-D036F4630AA8}" dt="2025-10-21T11:18:58.154" v="515" actId="478"/>
+          <ac:spMkLst>
+            <pc:docMk/>
+            <pc:sldMk cId="1593920805" sldId="262"/>
+            <ac:spMk id="6" creationId="{D6B4A624-4351-084B-75BD-2E5D6986EE71}"/>
           </ac:spMkLst>
         </pc:spChg>
         <pc:spChg chg="del">
@@ -299,7 +307,15 @@
           </ac:spMkLst>
         </pc:spChg>
         <pc:picChg chg="add mod">
-          <ac:chgData name="Kamil Warczek (kw316241)" userId="f3db8089-45d3-4ce7-81b6-9eb81915560c" providerId="ADAL" clId="{C3BDEFB5-E591-4296-8B5E-D036F4630AA8}" dt="2025-10-20T17:27:35.536" v="482" actId="1076"/>
+          <ac:chgData name="Kamil Warczek (kw316241)" userId="f3db8089-45d3-4ce7-81b6-9eb81915560c" providerId="ADAL" clId="{C3BDEFB5-E591-4296-8B5E-D036F4630AA8}" dt="2025-10-21T11:18:54.497" v="514" actId="1076"/>
+          <ac:picMkLst>
+            <pc:docMk/>
+            <pc:sldMk cId="1593920805" sldId="262"/>
+            <ac:picMk id="4" creationId="{C0A10DEF-40EF-662A-8B60-7E432846908E}"/>
+          </ac:picMkLst>
+        </pc:picChg>
+        <pc:picChg chg="add del mod">
+          <ac:chgData name="Kamil Warczek (kw316241)" userId="f3db8089-45d3-4ce7-81b6-9eb81915560c" providerId="ADAL" clId="{C3BDEFB5-E591-4296-8B5E-D036F4630AA8}" dt="2025-10-21T11:18:51.986" v="513" actId="478"/>
           <ac:picMkLst>
             <pc:docMk/>
             <pc:sldMk cId="1593920805" sldId="262"/>
@@ -479,7 +495,7 @@
         </pc:picChg>
       </pc:sldChg>
       <pc:sldChg chg="addSp delSp modSp mod modClrScheme chgLayout">
-        <pc:chgData name="Kamil Warczek (kw316241)" userId="f3db8089-45d3-4ce7-81b6-9eb81915560c" providerId="ADAL" clId="{C3BDEFB5-E591-4296-8B5E-D036F4630AA8}" dt="2025-10-20T17:21:18.689" v="346" actId="14100"/>
+        <pc:chgData name="Kamil Warczek (kw316241)" userId="f3db8089-45d3-4ce7-81b6-9eb81915560c" providerId="ADAL" clId="{C3BDEFB5-E591-4296-8B5E-D036F4630AA8}" dt="2025-10-21T10:47:37.096" v="507" actId="14826"/>
         <pc:sldMkLst>
           <pc:docMk/>
           <pc:sldMk cId="3396266754" sldId="283"/>
@@ -629,7 +645,7 @@
           </ac:spMkLst>
         </pc:spChg>
         <pc:picChg chg="add mod">
-          <ac:chgData name="Kamil Warczek (kw316241)" userId="f3db8089-45d3-4ce7-81b6-9eb81915560c" providerId="ADAL" clId="{C3BDEFB5-E591-4296-8B5E-D036F4630AA8}" dt="2025-10-20T17:21:18.689" v="346" actId="14100"/>
+          <ac:chgData name="Kamil Warczek (kw316241)" userId="f3db8089-45d3-4ce7-81b6-9eb81915560c" providerId="ADAL" clId="{C3BDEFB5-E591-4296-8B5E-D036F4630AA8}" dt="2025-10-21T10:47:37.096" v="507" actId="14826"/>
           <ac:picMkLst>
             <pc:docMk/>
             <pc:sldMk cId="3396266754" sldId="283"/>
@@ -957,7 +973,7 @@
             <a:pPr rtl="0"/>
             <a:fld id="{08F521E1-0C12-4760-BDE0-45E97124B4AC}" type="datetime1">
               <a:rPr lang="pl-PL" smtClean="0"/>
-              <a:t>20.10.2025</a:t>
+              <a:t>21.10.2025</a:t>
             </a:fld>
             <a:endParaRPr lang="pl-PL" dirty="0"/>
           </a:p>
@@ -1139,7 +1155,7 @@
             <a:fld id="{D8E38F4B-9F29-4743-AA85-EA4FA1270FE4}" type="datetime1">
               <a:rPr lang="pl-PL" smtClean="0"/>
               <a:pPr/>
-              <a:t>20.10.2025</a:t>
+              <a:t>21.10.2025</a:t>
             </a:fld>
             <a:endParaRPr lang="pl-PL" dirty="0"/>
           </a:p>
@@ -11331,7 +11347,7 @@
       </p:sp>
       <p:pic>
         <p:nvPicPr>
-          <p:cNvPr id="36" name="Picture 35" descr="A close-up of a yellow paper&#10;&#10;AI-generated content may be incorrect.">
+          <p:cNvPr id="36" name="Picture 35">
             <a:extLst>
               <a:ext uri="{FF2B5EF4-FFF2-40B4-BE49-F238E27FC236}">
                 <a16:creationId xmlns:a16="http://schemas.microsoft.com/office/drawing/2014/main" id="{34D8304B-20D2-A903-374F-E8792D0AEAE8}"/>
@@ -11345,14 +11361,13 @@
         </p:nvPicPr>
         <p:blipFill>
           <a:blip r:embed="rId4"/>
-          <a:stretch>
-            <a:fillRect/>
-          </a:stretch>
+          <a:srcRect/>
+          <a:stretch/>
         </p:blipFill>
         <p:spPr>
           <a:xfrm>
             <a:off x="2024448" y="501649"/>
-            <a:ext cx="8126267" cy="5274945"/>
+            <a:ext cx="8126266" cy="5274945"/>
           </a:xfrm>
           <a:prstGeom prst="rect">
             <a:avLst/>
@@ -11512,35 +11527,6 @@
           </a:p>
         </p:txBody>
       </p:sp>
-      <p:pic>
-        <p:nvPicPr>
-          <p:cNvPr id="24" name="Online Image Placeholder 23" descr="A screenshot of a computer&#10;&#10;AI-generated content may be incorrect.">
-            <a:extLst>
-              <a:ext uri="{FF2B5EF4-FFF2-40B4-BE49-F238E27FC236}">
-                <a16:creationId xmlns:a16="http://schemas.microsoft.com/office/drawing/2014/main" id="{71609742-85B4-CBC7-DB30-FB380152E4DD}"/>
-              </a:ext>
-            </a:extLst>
-          </p:cNvPr>
-          <p:cNvPicPr>
-            <a:picLocks noGrp="1" noChangeAspect="1"/>
-          </p:cNvPicPr>
-          <p:nvPr>
-            <p:ph type="clipArt" sz="quarter" idx="49"/>
-          </p:nvPr>
-        </p:nvPicPr>
-        <p:blipFill>
-          <a:blip r:embed="rId3"/>
-          <a:stretch>
-            <a:fillRect/>
-          </a:stretch>
-        </p:blipFill>
-        <p:spPr>
-          <a:xfrm>
-            <a:off x="2086261" y="559594"/>
-            <a:ext cx="8019478" cy="5159256"/>
-          </a:xfrm>
-        </p:spPr>
-      </p:pic>
       <p:sp>
         <p:nvSpPr>
           <p:cNvPr id="25" name="TextBox 24">
@@ -11587,6 +11573,36 @@
           </a:p>
         </p:txBody>
       </p:sp>
+      <p:pic>
+        <p:nvPicPr>
+          <p:cNvPr id="4" name="Picture 3" descr="A screenshot of a computer&#10;&#10;AI-generated content may be incorrect.">
+            <a:extLst>
+              <a:ext uri="{FF2B5EF4-FFF2-40B4-BE49-F238E27FC236}">
+                <a16:creationId xmlns:a16="http://schemas.microsoft.com/office/drawing/2014/main" id="{C0A10DEF-40EF-662A-8B60-7E432846908E}"/>
+              </a:ext>
+            </a:extLst>
+          </p:cNvPr>
+          <p:cNvPicPr>
+            <a:picLocks noChangeAspect="1"/>
+          </p:cNvPicPr>
+          <p:nvPr/>
+        </p:nvPicPr>
+        <p:blipFill>
+          <a:blip r:embed="rId3"/>
+          <a:stretch>
+            <a:fillRect/>
+          </a:stretch>
+        </p:blipFill>
+        <p:spPr>
+          <a:xfrm>
+            <a:off x="1083371" y="559594"/>
+            <a:ext cx="9081288" cy="5847231"/>
+          </a:xfrm>
+          <a:prstGeom prst="rect">
+            <a:avLst/>
+          </a:prstGeom>
+        </p:spPr>
+      </p:pic>
     </p:spTree>
     <p:extLst>
       <p:ext uri="{BB962C8B-B14F-4D97-AF65-F5344CB8AC3E}">

</xml_diff>